<commit_message>
modify Excel scroll (need Wheelscroll.ahk)
</commit_message>
<xml_diff>
--- a/マニュアル.pptx
+++ b/マニュアル.pptx
@@ -261,7 +261,7 @@
           <a:p>
             <a:fld id="{8FB4C7EE-3C5D-4F47-A8DE-21B759CA57C5}" type="datetimeFigureOut">
               <a:rPr kumimoji="1" lang="ja-JP" altLang="en-US" smtClean="0"/>
-              <a:t>2015/8/25</a:t>
+              <a:t>2015/9/14</a:t>
             </a:fld>
             <a:endParaRPr kumimoji="1" lang="ja-JP" altLang="en-US"/>
           </a:p>
@@ -463,7 +463,7 @@
           <a:p>
             <a:fld id="{8FB4C7EE-3C5D-4F47-A8DE-21B759CA57C5}" type="datetimeFigureOut">
               <a:rPr kumimoji="1" lang="ja-JP" altLang="en-US" smtClean="0"/>
-              <a:t>2015/8/25</a:t>
+              <a:t>2015/9/14</a:t>
             </a:fld>
             <a:endParaRPr kumimoji="1" lang="ja-JP" altLang="en-US"/>
           </a:p>
@@ -675,7 +675,7 @@
           <a:p>
             <a:fld id="{8FB4C7EE-3C5D-4F47-A8DE-21B759CA57C5}" type="datetimeFigureOut">
               <a:rPr kumimoji="1" lang="ja-JP" altLang="en-US" smtClean="0"/>
-              <a:t>2015/8/25</a:t>
+              <a:t>2015/9/14</a:t>
             </a:fld>
             <a:endParaRPr kumimoji="1" lang="ja-JP" altLang="en-US"/>
           </a:p>
@@ -877,7 +877,7 @@
           <a:p>
             <a:fld id="{8FB4C7EE-3C5D-4F47-A8DE-21B759CA57C5}" type="datetimeFigureOut">
               <a:rPr kumimoji="1" lang="ja-JP" altLang="en-US" smtClean="0"/>
-              <a:t>2015/8/25</a:t>
+              <a:t>2015/9/14</a:t>
             </a:fld>
             <a:endParaRPr kumimoji="1" lang="ja-JP" altLang="en-US"/>
           </a:p>
@@ -1121,7 +1121,7 @@
           <a:p>
             <a:fld id="{8FB4C7EE-3C5D-4F47-A8DE-21B759CA57C5}" type="datetimeFigureOut">
               <a:rPr kumimoji="1" lang="ja-JP" altLang="en-US" smtClean="0"/>
-              <a:t>2015/8/25</a:t>
+              <a:t>2015/9/14</a:t>
             </a:fld>
             <a:endParaRPr kumimoji="1" lang="ja-JP" altLang="en-US"/>
           </a:p>
@@ -1417,7 +1417,7 @@
           <a:p>
             <a:fld id="{8FB4C7EE-3C5D-4F47-A8DE-21B759CA57C5}" type="datetimeFigureOut">
               <a:rPr kumimoji="1" lang="ja-JP" altLang="en-US" smtClean="0"/>
-              <a:t>2015/8/25</a:t>
+              <a:t>2015/9/14</a:t>
             </a:fld>
             <a:endParaRPr kumimoji="1" lang="ja-JP" altLang="en-US"/>
           </a:p>
@@ -1848,7 +1848,7 @@
           <a:p>
             <a:fld id="{8FB4C7EE-3C5D-4F47-A8DE-21B759CA57C5}" type="datetimeFigureOut">
               <a:rPr kumimoji="1" lang="ja-JP" altLang="en-US" smtClean="0"/>
-              <a:t>2015/8/25</a:t>
+              <a:t>2015/9/14</a:t>
             </a:fld>
             <a:endParaRPr kumimoji="1" lang="ja-JP" altLang="en-US"/>
           </a:p>
@@ -1966,7 +1966,7 @@
           <a:p>
             <a:fld id="{8FB4C7EE-3C5D-4F47-A8DE-21B759CA57C5}" type="datetimeFigureOut">
               <a:rPr kumimoji="1" lang="ja-JP" altLang="en-US" smtClean="0"/>
-              <a:t>2015/8/25</a:t>
+              <a:t>2015/9/14</a:t>
             </a:fld>
             <a:endParaRPr kumimoji="1" lang="ja-JP" altLang="en-US"/>
           </a:p>
@@ -2061,7 +2061,7 @@
           <a:p>
             <a:fld id="{8FB4C7EE-3C5D-4F47-A8DE-21B759CA57C5}" type="datetimeFigureOut">
               <a:rPr kumimoji="1" lang="ja-JP" altLang="en-US" smtClean="0"/>
-              <a:t>2015/8/25</a:t>
+              <a:t>2015/9/14</a:t>
             </a:fld>
             <a:endParaRPr kumimoji="1" lang="ja-JP" altLang="en-US"/>
           </a:p>
@@ -2370,7 +2370,7 @@
           <a:p>
             <a:fld id="{8FB4C7EE-3C5D-4F47-A8DE-21B759CA57C5}" type="datetimeFigureOut">
               <a:rPr kumimoji="1" lang="ja-JP" altLang="en-US" smtClean="0"/>
-              <a:t>2015/8/25</a:t>
+              <a:t>2015/9/14</a:t>
             </a:fld>
             <a:endParaRPr kumimoji="1" lang="ja-JP" altLang="en-US"/>
           </a:p>
@@ -2627,7 +2627,7 @@
           <a:p>
             <a:fld id="{8FB4C7EE-3C5D-4F47-A8DE-21B759CA57C5}" type="datetimeFigureOut">
               <a:rPr kumimoji="1" lang="ja-JP" altLang="en-US" smtClean="0"/>
-              <a:t>2015/8/25</a:t>
+              <a:t>2015/9/14</a:t>
             </a:fld>
             <a:endParaRPr kumimoji="1" lang="ja-JP" altLang="en-US"/>
           </a:p>
@@ -2872,7 +2872,7 @@
           <a:p>
             <a:fld id="{8FB4C7EE-3C5D-4F47-A8DE-21B759CA57C5}" type="datetimeFigureOut">
               <a:rPr kumimoji="1" lang="ja-JP" altLang="en-US" smtClean="0"/>
-              <a:t>2015/8/25</a:t>
+              <a:t>2015/9/14</a:t>
             </a:fld>
             <a:endParaRPr kumimoji="1" lang="ja-JP" altLang="en-US"/>
           </a:p>
@@ -21541,9 +21541,18 @@
               <a:buNone/>
             </a:pPr>
             <a:r>
-              <a:rPr lang="en-US" altLang="ja-JP" sz="4000" dirty="0" smtClean="0"/>
-              <a:t>On PPT</a:t>
-            </a:r>
+              <a:rPr lang="en-US" altLang="ja-JP" sz="4000" dirty="0" smtClean="0">
+                <a:solidFill>
+                  <a:srgbClr val="C00000"/>
+                </a:solidFill>
+              </a:rPr>
+              <a:t>On</a:t>
+            </a:r>
+            <a:endParaRPr lang="en-US" altLang="ja-JP" sz="4000" dirty="0" smtClean="0">
+              <a:solidFill>
+                <a:srgbClr val="C00000"/>
+              </a:solidFill>
+            </a:endParaRPr>
           </a:p>
         </p:txBody>
       </p:sp>
@@ -22187,7 +22196,11 @@
           <a:lstStyle/>
           <a:p>
             <a:pPr algn="ctr"/>
-            <a:endParaRPr kumimoji="1" lang="ja-JP" altLang="en-US" sz="900"/>
+            <a:r>
+              <a:rPr kumimoji="1" lang="ja-JP" altLang="en-US" sz="900" dirty="0" smtClean="0"/>
+              <a:t>ビュー</a:t>
+            </a:r>
+            <a:endParaRPr kumimoji="1" lang="ja-JP" altLang="en-US" sz="900" dirty="0"/>
           </a:p>
         </p:txBody>
       </p:sp>
@@ -22559,18 +22572,42 @@
           <a:p>
             <a:pPr algn="ctr"/>
             <a:r>
-              <a:rPr kumimoji="1" lang="ja-JP" altLang="en-US" sz="900" dirty="0" smtClean="0"/>
+              <a:rPr kumimoji="1" lang="ja-JP" altLang="en-US" sz="900" dirty="0" smtClean="0">
+                <a:solidFill>
+                  <a:schemeClr val="accent6">
+                    <a:lumMod val="75000"/>
+                  </a:schemeClr>
+                </a:solidFill>
+              </a:rPr>
               <a:t>青</a:t>
             </a:r>
-            <a:endParaRPr kumimoji="1" lang="en-US" altLang="ja-JP" sz="900" dirty="0" smtClean="0"/>
-          </a:p>
-          <a:p>
-            <a:pPr algn="ctr"/>
-            <a:r>
-              <a:rPr lang="ja-JP" altLang="en-US" sz="900" dirty="0"/>
+            <a:endParaRPr kumimoji="1" lang="en-US" altLang="ja-JP" sz="900" dirty="0" smtClean="0">
+              <a:solidFill>
+                <a:schemeClr val="accent6">
+                  <a:lumMod val="75000"/>
+                </a:schemeClr>
+              </a:solidFill>
+            </a:endParaRPr>
+          </a:p>
+          <a:p>
+            <a:pPr algn="ctr"/>
+            <a:r>
+              <a:rPr lang="ja-JP" altLang="en-US" sz="900" dirty="0">
+                <a:solidFill>
+                  <a:schemeClr val="accent6">
+                    <a:lumMod val="75000"/>
+                  </a:schemeClr>
+                </a:solidFill>
+              </a:rPr>
               <a:t>枠線</a:t>
             </a:r>
-            <a:endParaRPr kumimoji="1" lang="ja-JP" altLang="en-US" sz="900" dirty="0"/>
+            <a:endParaRPr kumimoji="1" lang="ja-JP" altLang="en-US" sz="900" dirty="0">
+              <a:solidFill>
+                <a:schemeClr val="accent6">
+                  <a:lumMod val="75000"/>
+                </a:schemeClr>
+              </a:solidFill>
+            </a:endParaRPr>
           </a:p>
         </p:txBody>
       </p:sp>
@@ -22609,18 +22646,42 @@
           <a:p>
             <a:pPr algn="ctr"/>
             <a:r>
-              <a:rPr kumimoji="1" lang="ja-JP" altLang="en-US" sz="900" dirty="0" smtClean="0"/>
+              <a:rPr kumimoji="1" lang="ja-JP" altLang="en-US" sz="900" dirty="0" smtClean="0">
+                <a:solidFill>
+                  <a:schemeClr val="accent6">
+                    <a:lumMod val="75000"/>
+                  </a:schemeClr>
+                </a:solidFill>
+              </a:rPr>
               <a:t>緑</a:t>
             </a:r>
-            <a:endParaRPr kumimoji="1" lang="en-US" altLang="ja-JP" sz="900" dirty="0" smtClean="0"/>
-          </a:p>
-          <a:p>
-            <a:pPr algn="ctr"/>
-            <a:r>
-              <a:rPr lang="ja-JP" altLang="en-US" sz="900" dirty="0"/>
+            <a:endParaRPr kumimoji="1" lang="en-US" altLang="ja-JP" sz="900" dirty="0" smtClean="0">
+              <a:solidFill>
+                <a:schemeClr val="accent6">
+                  <a:lumMod val="75000"/>
+                </a:schemeClr>
+              </a:solidFill>
+            </a:endParaRPr>
+          </a:p>
+          <a:p>
+            <a:pPr algn="ctr"/>
+            <a:r>
+              <a:rPr lang="ja-JP" altLang="en-US" sz="900" dirty="0">
+                <a:solidFill>
+                  <a:schemeClr val="accent6">
+                    <a:lumMod val="75000"/>
+                  </a:schemeClr>
+                </a:solidFill>
+              </a:rPr>
               <a:t>枠線</a:t>
             </a:r>
-            <a:endParaRPr kumimoji="1" lang="ja-JP" altLang="en-US" sz="900" dirty="0"/>
+            <a:endParaRPr kumimoji="1" lang="ja-JP" altLang="en-US" sz="900" dirty="0">
+              <a:solidFill>
+                <a:schemeClr val="accent6">
+                  <a:lumMod val="75000"/>
+                </a:schemeClr>
+              </a:solidFill>
+            </a:endParaRPr>
           </a:p>
         </p:txBody>
       </p:sp>
@@ -22659,18 +22720,42 @@
           <a:p>
             <a:pPr algn="ctr"/>
             <a:r>
-              <a:rPr kumimoji="1" lang="ja-JP" altLang="en-US" sz="900" dirty="0" smtClean="0"/>
+              <a:rPr kumimoji="1" lang="ja-JP" altLang="en-US" sz="900" dirty="0" smtClean="0">
+                <a:solidFill>
+                  <a:schemeClr val="accent6">
+                    <a:lumMod val="75000"/>
+                  </a:schemeClr>
+                </a:solidFill>
+              </a:rPr>
               <a:t>赤</a:t>
             </a:r>
-            <a:endParaRPr kumimoji="1" lang="en-US" altLang="ja-JP" sz="900" dirty="0" smtClean="0"/>
-          </a:p>
-          <a:p>
-            <a:pPr algn="ctr"/>
-            <a:r>
-              <a:rPr lang="ja-JP" altLang="en-US" sz="900" dirty="0"/>
+            <a:endParaRPr kumimoji="1" lang="en-US" altLang="ja-JP" sz="900" dirty="0" smtClean="0">
+              <a:solidFill>
+                <a:schemeClr val="accent6">
+                  <a:lumMod val="75000"/>
+                </a:schemeClr>
+              </a:solidFill>
+            </a:endParaRPr>
+          </a:p>
+          <a:p>
+            <a:pPr algn="ctr"/>
+            <a:r>
+              <a:rPr lang="ja-JP" altLang="en-US" sz="900" dirty="0">
+                <a:solidFill>
+                  <a:schemeClr val="accent6">
+                    <a:lumMod val="75000"/>
+                  </a:schemeClr>
+                </a:solidFill>
+              </a:rPr>
               <a:t>枠線</a:t>
             </a:r>
-            <a:endParaRPr kumimoji="1" lang="ja-JP" altLang="en-US" sz="900" dirty="0"/>
+            <a:endParaRPr kumimoji="1" lang="ja-JP" altLang="en-US" sz="900" dirty="0">
+              <a:solidFill>
+                <a:schemeClr val="accent6">
+                  <a:lumMod val="75000"/>
+                </a:schemeClr>
+              </a:solidFill>
+            </a:endParaRPr>
           </a:p>
         </p:txBody>
       </p:sp>
@@ -22709,18 +22794,42 @@
           <a:p>
             <a:pPr algn="ctr"/>
             <a:r>
-              <a:rPr kumimoji="1" lang="ja-JP" altLang="en-US" sz="900" dirty="0" smtClean="0"/>
+              <a:rPr kumimoji="1" lang="ja-JP" altLang="en-US" sz="900" dirty="0" smtClean="0">
+                <a:solidFill>
+                  <a:schemeClr val="accent6">
+                    <a:lumMod val="75000"/>
+                  </a:schemeClr>
+                </a:solidFill>
+              </a:rPr>
               <a:t>枠線</a:t>
             </a:r>
-            <a:endParaRPr kumimoji="1" lang="en-US" altLang="ja-JP" sz="900" dirty="0" smtClean="0"/>
-          </a:p>
-          <a:p>
-            <a:pPr algn="ctr"/>
-            <a:r>
-              <a:rPr lang="ja-JP" altLang="en-US" sz="900" dirty="0"/>
+            <a:endParaRPr kumimoji="1" lang="en-US" altLang="ja-JP" sz="900" dirty="0" smtClean="0">
+              <a:solidFill>
+                <a:schemeClr val="accent6">
+                  <a:lumMod val="75000"/>
+                </a:schemeClr>
+              </a:solidFill>
+            </a:endParaRPr>
+          </a:p>
+          <a:p>
+            <a:pPr algn="ctr"/>
+            <a:r>
+              <a:rPr lang="ja-JP" altLang="en-US" sz="900" dirty="0">
+                <a:solidFill>
+                  <a:schemeClr val="accent6">
+                    <a:lumMod val="75000"/>
+                  </a:schemeClr>
+                </a:solidFill>
+              </a:rPr>
               <a:t>色変更</a:t>
             </a:r>
-            <a:endParaRPr kumimoji="1" lang="ja-JP" altLang="en-US" sz="900" dirty="0"/>
+            <a:endParaRPr kumimoji="1" lang="ja-JP" altLang="en-US" sz="900" dirty="0">
+              <a:solidFill>
+                <a:schemeClr val="accent6">
+                  <a:lumMod val="75000"/>
+                </a:schemeClr>
+              </a:solidFill>
+            </a:endParaRPr>
           </a:p>
         </p:txBody>
       </p:sp>
@@ -23063,30 +23172,540 @@
           <a:p>
             <a:pPr algn="ctr"/>
             <a:r>
-              <a:rPr kumimoji="1" lang="ja-JP" altLang="en-US" sz="900" dirty="0" smtClean="0"/>
+              <a:rPr kumimoji="1" lang="ja-JP" altLang="en-US" sz="900" dirty="0" smtClean="0">
+                <a:solidFill>
+                  <a:schemeClr val="accent6">
+                    <a:lumMod val="75000"/>
+                  </a:schemeClr>
+                </a:solidFill>
+              </a:rPr>
               <a:t>橙</a:t>
             </a:r>
+            <a:endParaRPr kumimoji="1" lang="en-US" altLang="ja-JP" sz="900" dirty="0" smtClean="0">
+              <a:solidFill>
+                <a:schemeClr val="accent6">
+                  <a:lumMod val="75000"/>
+                </a:schemeClr>
+              </a:solidFill>
+            </a:endParaRPr>
+          </a:p>
+          <a:p>
+            <a:pPr algn="ctr"/>
+            <a:r>
+              <a:rPr lang="ja-JP" altLang="en-US" sz="900" dirty="0" smtClean="0">
+                <a:solidFill>
+                  <a:schemeClr val="accent6">
+                    <a:lumMod val="75000"/>
+                  </a:schemeClr>
+                </a:solidFill>
+              </a:rPr>
+              <a:t>枠線</a:t>
+            </a:r>
+            <a:endParaRPr kumimoji="1" lang="ja-JP" altLang="en-US" sz="900" dirty="0">
+              <a:solidFill>
+                <a:schemeClr val="accent6">
+                  <a:lumMod val="75000"/>
+                </a:schemeClr>
+              </a:solidFill>
+            </a:endParaRPr>
+          </a:p>
+        </p:txBody>
+      </p:sp>
+      <p:sp>
+        <p:nvSpPr>
+          <p:cNvPr id="103" name="角丸四角形 102"/>
+          <p:cNvSpPr/>
+          <p:nvPr/>
+        </p:nvSpPr>
+        <p:spPr>
+          <a:xfrm>
+            <a:off x="746114" y="3398078"/>
+            <a:ext cx="466343" cy="467140"/>
+          </a:xfrm>
+          <a:prstGeom prst="roundRect">
+            <a:avLst/>
+          </a:prstGeom>
+        </p:spPr>
+        <p:style>
+          <a:lnRef idx="2">
+            <a:schemeClr val="accent6"/>
+          </a:lnRef>
+          <a:fillRef idx="1">
+            <a:schemeClr val="lt1"/>
+          </a:fillRef>
+          <a:effectRef idx="0">
+            <a:schemeClr val="accent6"/>
+          </a:effectRef>
+          <a:fontRef idx="minor">
+            <a:schemeClr val="dk1"/>
+          </a:fontRef>
+        </p:style>
+        <p:txBody>
+          <a:bodyPr wrap="none" rtlCol="0" anchor="ctr"/>
+          <a:lstStyle/>
+          <a:p>
+            <a:pPr algn="ctr"/>
+            <a:endParaRPr kumimoji="1" lang="ja-JP" altLang="en-US" sz="900" dirty="0"/>
+          </a:p>
+        </p:txBody>
+      </p:sp>
+      <p:sp>
+        <p:nvSpPr>
+          <p:cNvPr id="82" name="角丸四角形 81"/>
+          <p:cNvSpPr/>
+          <p:nvPr/>
+        </p:nvSpPr>
+        <p:spPr>
+          <a:xfrm>
+            <a:off x="2078261" y="3930376"/>
+            <a:ext cx="466343" cy="467140"/>
+          </a:xfrm>
+          <a:prstGeom prst="roundRect">
+            <a:avLst/>
+          </a:prstGeom>
+        </p:spPr>
+        <p:style>
+          <a:lnRef idx="2">
+            <a:schemeClr val="accent6"/>
+          </a:lnRef>
+          <a:fillRef idx="1">
+            <a:schemeClr val="lt1"/>
+          </a:fillRef>
+          <a:effectRef idx="0">
+            <a:schemeClr val="accent6"/>
+          </a:effectRef>
+          <a:fontRef idx="minor">
+            <a:schemeClr val="dk1"/>
+          </a:fontRef>
+        </p:style>
+        <p:txBody>
+          <a:bodyPr wrap="none" rtlCol="0" anchor="ctr"/>
+          <a:lstStyle/>
+          <a:p>
+            <a:pPr algn="ctr"/>
+            <a:r>
+              <a:rPr kumimoji="1" lang="ja-JP" altLang="en-US" sz="900" dirty="0" smtClean="0">
+                <a:solidFill>
+                  <a:schemeClr val="accent5">
+                    <a:lumMod val="75000"/>
+                  </a:schemeClr>
+                </a:solidFill>
+              </a:rPr>
+              <a:t>青</a:t>
+            </a:r>
+            <a:endParaRPr kumimoji="1" lang="en-US" altLang="ja-JP" sz="900" dirty="0" smtClean="0">
+              <a:solidFill>
+                <a:schemeClr val="accent5">
+                  <a:lumMod val="75000"/>
+                </a:schemeClr>
+              </a:solidFill>
+            </a:endParaRPr>
+          </a:p>
+          <a:p>
+            <a:pPr algn="ctr"/>
+            <a:r>
+              <a:rPr lang="ja-JP" altLang="en-US" sz="900" dirty="0">
+                <a:solidFill>
+                  <a:schemeClr val="accent5">
+                    <a:lumMod val="75000"/>
+                  </a:schemeClr>
+                </a:solidFill>
+              </a:rPr>
+              <a:t>文字</a:t>
+            </a:r>
+            <a:endParaRPr kumimoji="1" lang="ja-JP" altLang="en-US" sz="900" dirty="0">
+              <a:solidFill>
+                <a:schemeClr val="accent5">
+                  <a:lumMod val="75000"/>
+                </a:schemeClr>
+              </a:solidFill>
+            </a:endParaRPr>
+          </a:p>
+        </p:txBody>
+      </p:sp>
+      <p:sp>
+        <p:nvSpPr>
+          <p:cNvPr id="83" name="角丸四角形 82"/>
+          <p:cNvSpPr/>
+          <p:nvPr/>
+        </p:nvSpPr>
+        <p:spPr>
+          <a:xfrm>
+            <a:off x="2612397" y="3930376"/>
+            <a:ext cx="466343" cy="467140"/>
+          </a:xfrm>
+          <a:prstGeom prst="roundRect">
+            <a:avLst/>
+          </a:prstGeom>
+        </p:spPr>
+        <p:style>
+          <a:lnRef idx="2">
+            <a:schemeClr val="accent6"/>
+          </a:lnRef>
+          <a:fillRef idx="1">
+            <a:schemeClr val="lt1"/>
+          </a:fillRef>
+          <a:effectRef idx="0">
+            <a:schemeClr val="accent6"/>
+          </a:effectRef>
+          <a:fontRef idx="minor">
+            <a:schemeClr val="dk1"/>
+          </a:fontRef>
+        </p:style>
+        <p:txBody>
+          <a:bodyPr wrap="none" rtlCol="0" anchor="ctr"/>
+          <a:lstStyle/>
+          <a:p>
+            <a:pPr algn="ctr"/>
+            <a:r>
+              <a:rPr kumimoji="1" lang="ja-JP" altLang="en-US" sz="900" dirty="0" smtClean="0">
+                <a:solidFill>
+                  <a:schemeClr val="accent5">
+                    <a:lumMod val="75000"/>
+                  </a:schemeClr>
+                </a:solidFill>
+              </a:rPr>
+              <a:t>緑</a:t>
+            </a:r>
+            <a:endParaRPr kumimoji="1" lang="en-US" altLang="ja-JP" sz="900" dirty="0" smtClean="0">
+              <a:solidFill>
+                <a:schemeClr val="accent5">
+                  <a:lumMod val="75000"/>
+                </a:schemeClr>
+              </a:solidFill>
+            </a:endParaRPr>
+          </a:p>
+          <a:p>
+            <a:pPr algn="ctr"/>
+            <a:r>
+              <a:rPr lang="ja-JP" altLang="en-US" sz="900" dirty="0">
+                <a:solidFill>
+                  <a:schemeClr val="accent5">
+                    <a:lumMod val="75000"/>
+                  </a:schemeClr>
+                </a:solidFill>
+              </a:rPr>
+              <a:t>文字</a:t>
+            </a:r>
+            <a:endParaRPr kumimoji="1" lang="ja-JP" altLang="en-US" sz="900" dirty="0">
+              <a:solidFill>
+                <a:schemeClr val="accent5">
+                  <a:lumMod val="75000"/>
+                </a:schemeClr>
+              </a:solidFill>
+            </a:endParaRPr>
+          </a:p>
+        </p:txBody>
+      </p:sp>
+      <p:sp>
+        <p:nvSpPr>
+          <p:cNvPr id="84" name="角丸四角形 83"/>
+          <p:cNvSpPr/>
+          <p:nvPr/>
+        </p:nvSpPr>
+        <p:spPr>
+          <a:xfrm>
+            <a:off x="3146533" y="3930376"/>
+            <a:ext cx="466343" cy="467140"/>
+          </a:xfrm>
+          <a:prstGeom prst="roundRect">
+            <a:avLst/>
+          </a:prstGeom>
+        </p:spPr>
+        <p:style>
+          <a:lnRef idx="2">
+            <a:schemeClr val="accent6"/>
+          </a:lnRef>
+          <a:fillRef idx="1">
+            <a:schemeClr val="lt1"/>
+          </a:fillRef>
+          <a:effectRef idx="0">
+            <a:schemeClr val="accent6"/>
+          </a:effectRef>
+          <a:fontRef idx="minor">
+            <a:schemeClr val="dk1"/>
+          </a:fontRef>
+        </p:style>
+        <p:txBody>
+          <a:bodyPr wrap="none" rtlCol="0" anchor="ctr"/>
+          <a:lstStyle/>
+          <a:p>
+            <a:pPr algn="ctr"/>
+            <a:r>
+              <a:rPr kumimoji="1" lang="ja-JP" altLang="en-US" sz="900" dirty="0" smtClean="0">
+                <a:solidFill>
+                  <a:schemeClr val="accent5">
+                    <a:lumMod val="75000"/>
+                  </a:schemeClr>
+                </a:solidFill>
+              </a:rPr>
+              <a:t>赤</a:t>
+            </a:r>
+            <a:endParaRPr kumimoji="1" lang="en-US" altLang="ja-JP" sz="900" dirty="0" smtClean="0">
+              <a:solidFill>
+                <a:schemeClr val="accent5">
+                  <a:lumMod val="75000"/>
+                </a:schemeClr>
+              </a:solidFill>
+            </a:endParaRPr>
+          </a:p>
+          <a:p>
+            <a:pPr algn="ctr"/>
+            <a:r>
+              <a:rPr lang="ja-JP" altLang="en-US" sz="900" dirty="0">
+                <a:solidFill>
+                  <a:schemeClr val="accent5">
+                    <a:lumMod val="75000"/>
+                  </a:schemeClr>
+                </a:solidFill>
+              </a:rPr>
+              <a:t>文字</a:t>
+            </a:r>
+            <a:endParaRPr kumimoji="1" lang="ja-JP" altLang="en-US" sz="900" dirty="0">
+              <a:solidFill>
+                <a:schemeClr val="accent5">
+                  <a:lumMod val="75000"/>
+                </a:schemeClr>
+              </a:solidFill>
+            </a:endParaRPr>
+          </a:p>
+        </p:txBody>
+      </p:sp>
+      <p:sp>
+        <p:nvSpPr>
+          <p:cNvPr id="85" name="角丸四角形 84"/>
+          <p:cNvSpPr/>
+          <p:nvPr/>
+        </p:nvSpPr>
+        <p:spPr>
+          <a:xfrm>
+            <a:off x="3680669" y="3930376"/>
+            <a:ext cx="466343" cy="467140"/>
+          </a:xfrm>
+          <a:prstGeom prst="roundRect">
+            <a:avLst/>
+          </a:prstGeom>
+        </p:spPr>
+        <p:style>
+          <a:lnRef idx="2">
+            <a:schemeClr val="accent6"/>
+          </a:lnRef>
+          <a:fillRef idx="1">
+            <a:schemeClr val="lt1"/>
+          </a:fillRef>
+          <a:effectRef idx="0">
+            <a:schemeClr val="accent6"/>
+          </a:effectRef>
+          <a:fontRef idx="minor">
+            <a:schemeClr val="dk1"/>
+          </a:fontRef>
+        </p:style>
+        <p:txBody>
+          <a:bodyPr wrap="none" rtlCol="0" anchor="ctr"/>
+          <a:lstStyle/>
+          <a:p>
+            <a:pPr algn="ctr"/>
+            <a:r>
+              <a:rPr kumimoji="1" lang="ja-JP" altLang="en-US" sz="900" dirty="0" smtClean="0">
+                <a:solidFill>
+                  <a:schemeClr val="accent5">
+                    <a:lumMod val="75000"/>
+                  </a:schemeClr>
+                </a:solidFill>
+              </a:rPr>
+              <a:t>文字</a:t>
+            </a:r>
+            <a:endParaRPr kumimoji="1" lang="en-US" altLang="ja-JP" sz="900" dirty="0" smtClean="0">
+              <a:solidFill>
+                <a:schemeClr val="accent5">
+                  <a:lumMod val="75000"/>
+                </a:schemeClr>
+              </a:solidFill>
+            </a:endParaRPr>
+          </a:p>
+          <a:p>
+            <a:pPr algn="ctr"/>
+            <a:r>
+              <a:rPr lang="ja-JP" altLang="en-US" sz="900" dirty="0">
+                <a:solidFill>
+                  <a:schemeClr val="accent5">
+                    <a:lumMod val="75000"/>
+                  </a:schemeClr>
+                </a:solidFill>
+              </a:rPr>
+              <a:t>色変更</a:t>
+            </a:r>
+            <a:endParaRPr kumimoji="1" lang="ja-JP" altLang="en-US" sz="900" dirty="0">
+              <a:solidFill>
+                <a:schemeClr val="accent5">
+                  <a:lumMod val="75000"/>
+                </a:schemeClr>
+              </a:solidFill>
+            </a:endParaRPr>
+          </a:p>
+        </p:txBody>
+      </p:sp>
+      <p:sp>
+        <p:nvSpPr>
+          <p:cNvPr id="86" name="角丸四角形 85"/>
+          <p:cNvSpPr/>
+          <p:nvPr/>
+        </p:nvSpPr>
+        <p:spPr>
+          <a:xfrm>
+            <a:off x="4214805" y="3930376"/>
+            <a:ext cx="466343" cy="467140"/>
+          </a:xfrm>
+          <a:prstGeom prst="roundRect">
+            <a:avLst/>
+          </a:prstGeom>
+        </p:spPr>
+        <p:style>
+          <a:lnRef idx="2">
+            <a:schemeClr val="accent6"/>
+          </a:lnRef>
+          <a:fillRef idx="1">
+            <a:schemeClr val="lt1"/>
+          </a:fillRef>
+          <a:effectRef idx="0">
+            <a:schemeClr val="accent6"/>
+          </a:effectRef>
+          <a:fontRef idx="minor">
+            <a:schemeClr val="dk1"/>
+          </a:fontRef>
+        </p:style>
+        <p:txBody>
+          <a:bodyPr wrap="none" rtlCol="0" anchor="ctr"/>
+          <a:lstStyle/>
+          <a:p>
+            <a:pPr algn="ctr"/>
+            <a:endParaRPr kumimoji="1" lang="ja-JP" altLang="en-US" sz="900" dirty="0"/>
+          </a:p>
+        </p:txBody>
+      </p:sp>
+      <p:sp>
+        <p:nvSpPr>
+          <p:cNvPr id="87" name="角丸四角形 86"/>
+          <p:cNvSpPr/>
+          <p:nvPr/>
+        </p:nvSpPr>
+        <p:spPr>
+          <a:xfrm>
+            <a:off x="4748941" y="3930376"/>
+            <a:ext cx="466343" cy="467140"/>
+          </a:xfrm>
+          <a:prstGeom prst="roundRect">
+            <a:avLst/>
+          </a:prstGeom>
+        </p:spPr>
+        <p:style>
+          <a:lnRef idx="2">
+            <a:schemeClr val="accent6"/>
+          </a:lnRef>
+          <a:fillRef idx="1">
+            <a:schemeClr val="lt1"/>
+          </a:fillRef>
+          <a:effectRef idx="0">
+            <a:schemeClr val="accent6"/>
+          </a:effectRef>
+          <a:fontRef idx="minor">
+            <a:schemeClr val="dk1"/>
+          </a:fontRef>
+        </p:style>
+        <p:txBody>
+          <a:bodyPr wrap="none" rtlCol="0" anchor="ctr"/>
+          <a:lstStyle/>
+          <a:p>
+            <a:pPr algn="ctr"/>
+            <a:endParaRPr kumimoji="1" lang="ja-JP" altLang="en-US" sz="900" dirty="0"/>
+          </a:p>
+        </p:txBody>
+      </p:sp>
+      <p:sp>
+        <p:nvSpPr>
+          <p:cNvPr id="88" name="角丸四角形 87"/>
+          <p:cNvSpPr/>
+          <p:nvPr/>
+        </p:nvSpPr>
+        <p:spPr>
+          <a:xfrm>
+            <a:off x="5283077" y="3930376"/>
+            <a:ext cx="466343" cy="467140"/>
+          </a:xfrm>
+          <a:prstGeom prst="roundRect">
+            <a:avLst/>
+          </a:prstGeom>
+        </p:spPr>
+        <p:style>
+          <a:lnRef idx="2">
+            <a:schemeClr val="accent6"/>
+          </a:lnRef>
+          <a:fillRef idx="1">
+            <a:schemeClr val="lt1"/>
+          </a:fillRef>
+          <a:effectRef idx="0">
+            <a:schemeClr val="accent6"/>
+          </a:effectRef>
+          <a:fontRef idx="minor">
+            <a:schemeClr val="dk1"/>
+          </a:fontRef>
+        </p:style>
+        <p:txBody>
+          <a:bodyPr wrap="none" rtlCol="0" anchor="ctr"/>
+          <a:lstStyle/>
+          <a:p>
+            <a:pPr algn="ctr"/>
             <a:endParaRPr kumimoji="1" lang="en-US" altLang="ja-JP" sz="900" dirty="0" smtClean="0"/>
           </a:p>
-          <a:p>
-            <a:pPr algn="ctr"/>
-            <a:r>
-              <a:rPr lang="ja-JP" altLang="en-US" sz="900" dirty="0" smtClean="0"/>
-              <a:t>枠線</a:t>
-            </a:r>
+        </p:txBody>
+      </p:sp>
+      <p:sp>
+        <p:nvSpPr>
+          <p:cNvPr id="121" name="角丸四角形 120"/>
+          <p:cNvSpPr/>
+          <p:nvPr/>
+        </p:nvSpPr>
+        <p:spPr>
+          <a:xfrm>
+            <a:off x="5817213" y="3930376"/>
+            <a:ext cx="466343" cy="467140"/>
+          </a:xfrm>
+          <a:prstGeom prst="roundRect">
+            <a:avLst/>
+          </a:prstGeom>
+        </p:spPr>
+        <p:style>
+          <a:lnRef idx="2">
+            <a:schemeClr val="accent6"/>
+          </a:lnRef>
+          <a:fillRef idx="1">
+            <a:schemeClr val="lt1"/>
+          </a:fillRef>
+          <a:effectRef idx="0">
+            <a:schemeClr val="accent6"/>
+          </a:effectRef>
+          <a:fontRef idx="minor">
+            <a:schemeClr val="dk1"/>
+          </a:fontRef>
+        </p:style>
+        <p:txBody>
+          <a:bodyPr wrap="none" rtlCol="0" anchor="ctr"/>
+          <a:lstStyle/>
+          <a:p>
+            <a:pPr algn="ctr"/>
             <a:endParaRPr kumimoji="1" lang="ja-JP" altLang="en-US" sz="900" dirty="0"/>
           </a:p>
         </p:txBody>
       </p:sp>
       <p:sp>
         <p:nvSpPr>
-          <p:cNvPr id="103" name="角丸四角形 102"/>
-          <p:cNvSpPr/>
-          <p:nvPr/>
-        </p:nvSpPr>
-        <p:spPr>
-          <a:xfrm>
-            <a:off x="746114" y="3398078"/>
+          <p:cNvPr id="122" name="角丸四角形 121"/>
+          <p:cNvSpPr/>
+          <p:nvPr/>
+        </p:nvSpPr>
+        <p:spPr>
+          <a:xfrm>
+            <a:off x="6351349" y="3930376"/>
             <a:ext cx="466343" cy="467140"/>
           </a:xfrm>
           <a:prstGeom prst="roundRect">
@@ -23118,517 +23737,151 @@
       </p:sp>
       <p:sp>
         <p:nvSpPr>
-          <p:cNvPr id="82" name="角丸四角形 81"/>
-          <p:cNvSpPr/>
-          <p:nvPr/>
-        </p:nvSpPr>
-        <p:spPr>
-          <a:xfrm>
-            <a:off x="2078261" y="3930376"/>
-            <a:ext cx="466343" cy="467140"/>
-          </a:xfrm>
-          <a:prstGeom prst="roundRect">
-            <a:avLst/>
-          </a:prstGeom>
-        </p:spPr>
-        <p:style>
-          <a:lnRef idx="2">
-            <a:schemeClr val="accent6"/>
-          </a:lnRef>
-          <a:fillRef idx="1">
-            <a:schemeClr val="lt1"/>
-          </a:fillRef>
-          <a:effectRef idx="0">
-            <a:schemeClr val="accent6"/>
-          </a:effectRef>
-          <a:fontRef idx="minor">
-            <a:schemeClr val="dk1"/>
-          </a:fontRef>
-        </p:style>
-        <p:txBody>
-          <a:bodyPr wrap="none" rtlCol="0" anchor="ctr"/>
-          <a:lstStyle/>
-          <a:p>
-            <a:pPr algn="ctr"/>
-            <a:r>
-              <a:rPr kumimoji="1" lang="ja-JP" altLang="en-US" sz="900" dirty="0" smtClean="0"/>
-              <a:t>青</a:t>
-            </a:r>
-            <a:endParaRPr kumimoji="1" lang="en-US" altLang="ja-JP" sz="900" dirty="0" smtClean="0"/>
-          </a:p>
-          <a:p>
-            <a:pPr algn="ctr"/>
-            <a:r>
-              <a:rPr lang="ja-JP" altLang="en-US" sz="900" dirty="0"/>
+          <p:cNvPr id="123" name="角丸四角形 122"/>
+          <p:cNvSpPr/>
+          <p:nvPr/>
+        </p:nvSpPr>
+        <p:spPr>
+          <a:xfrm>
+            <a:off x="6885485" y="3930376"/>
+            <a:ext cx="466343" cy="467140"/>
+          </a:xfrm>
+          <a:prstGeom prst="roundRect">
+            <a:avLst/>
+          </a:prstGeom>
+        </p:spPr>
+        <p:style>
+          <a:lnRef idx="2">
+            <a:schemeClr val="accent6"/>
+          </a:lnRef>
+          <a:fillRef idx="1">
+            <a:schemeClr val="lt1"/>
+          </a:fillRef>
+          <a:effectRef idx="0">
+            <a:schemeClr val="accent6"/>
+          </a:effectRef>
+          <a:fontRef idx="minor">
+            <a:schemeClr val="dk1"/>
+          </a:fontRef>
+        </p:style>
+        <p:txBody>
+          <a:bodyPr wrap="none" rtlCol="0" anchor="ctr"/>
+          <a:lstStyle/>
+          <a:p>
+            <a:pPr algn="ctr"/>
+            <a:endParaRPr kumimoji="1" lang="ja-JP" altLang="en-US" sz="900" dirty="0"/>
+          </a:p>
+        </p:txBody>
+      </p:sp>
+      <p:sp>
+        <p:nvSpPr>
+          <p:cNvPr id="124" name="角丸四角形 123"/>
+          <p:cNvSpPr/>
+          <p:nvPr/>
+        </p:nvSpPr>
+        <p:spPr>
+          <a:xfrm>
+            <a:off x="7419621" y="3930376"/>
+            <a:ext cx="466343" cy="467140"/>
+          </a:xfrm>
+          <a:prstGeom prst="roundRect">
+            <a:avLst/>
+          </a:prstGeom>
+        </p:spPr>
+        <p:style>
+          <a:lnRef idx="2">
+            <a:schemeClr val="accent6"/>
+          </a:lnRef>
+          <a:fillRef idx="1">
+            <a:schemeClr val="lt1"/>
+          </a:fillRef>
+          <a:effectRef idx="0">
+            <a:schemeClr val="accent6"/>
+          </a:effectRef>
+          <a:fontRef idx="minor">
+            <a:schemeClr val="dk1"/>
+          </a:fontRef>
+        </p:style>
+        <p:txBody>
+          <a:bodyPr wrap="none" rtlCol="0" anchor="ctr"/>
+          <a:lstStyle/>
+          <a:p>
+            <a:pPr algn="ctr"/>
+            <a:endParaRPr kumimoji="1" lang="ja-JP" altLang="en-US" sz="900" dirty="0"/>
+          </a:p>
+        </p:txBody>
+      </p:sp>
+      <p:sp>
+        <p:nvSpPr>
+          <p:cNvPr id="125" name="角丸四角形 124"/>
+          <p:cNvSpPr/>
+          <p:nvPr/>
+        </p:nvSpPr>
+        <p:spPr>
+          <a:xfrm>
+            <a:off x="1544125" y="3930376"/>
+            <a:ext cx="466343" cy="467140"/>
+          </a:xfrm>
+          <a:prstGeom prst="roundRect">
+            <a:avLst/>
+          </a:prstGeom>
+        </p:spPr>
+        <p:style>
+          <a:lnRef idx="2">
+            <a:schemeClr val="accent6"/>
+          </a:lnRef>
+          <a:fillRef idx="1">
+            <a:schemeClr val="lt1"/>
+          </a:fillRef>
+          <a:effectRef idx="0">
+            <a:schemeClr val="accent6"/>
+          </a:effectRef>
+          <a:fontRef idx="minor">
+            <a:schemeClr val="dk1"/>
+          </a:fontRef>
+        </p:style>
+        <p:txBody>
+          <a:bodyPr wrap="none" rtlCol="0" anchor="ctr"/>
+          <a:lstStyle/>
+          <a:p>
+            <a:pPr algn="ctr"/>
+            <a:r>
+              <a:rPr kumimoji="1" lang="ja-JP" altLang="en-US" sz="900" dirty="0" smtClean="0">
+                <a:solidFill>
+                  <a:schemeClr val="accent5">
+                    <a:lumMod val="75000"/>
+                  </a:schemeClr>
+                </a:solidFill>
+              </a:rPr>
+              <a:t>橙</a:t>
+            </a:r>
+            <a:endParaRPr kumimoji="1" lang="en-US" altLang="ja-JP" sz="900" dirty="0" smtClean="0">
+              <a:solidFill>
+                <a:schemeClr val="accent5">
+                  <a:lumMod val="75000"/>
+                </a:schemeClr>
+              </a:solidFill>
+            </a:endParaRPr>
+          </a:p>
+          <a:p>
+            <a:pPr algn="ctr"/>
+            <a:r>
+              <a:rPr lang="ja-JP" altLang="en-US" sz="900" dirty="0">
+                <a:solidFill>
+                  <a:schemeClr val="accent5">
+                    <a:lumMod val="75000"/>
+                  </a:schemeClr>
+                </a:solidFill>
+              </a:rPr>
               <a:t>文字</a:t>
             </a:r>
-            <a:endParaRPr kumimoji="1" lang="ja-JP" altLang="en-US" sz="900" dirty="0"/>
-          </a:p>
-        </p:txBody>
-      </p:sp>
-      <p:sp>
-        <p:nvSpPr>
-          <p:cNvPr id="83" name="角丸四角形 82"/>
-          <p:cNvSpPr/>
-          <p:nvPr/>
-        </p:nvSpPr>
-        <p:spPr>
-          <a:xfrm>
-            <a:off x="2612397" y="3930376"/>
-            <a:ext cx="466343" cy="467140"/>
-          </a:xfrm>
-          <a:prstGeom prst="roundRect">
-            <a:avLst/>
-          </a:prstGeom>
-        </p:spPr>
-        <p:style>
-          <a:lnRef idx="2">
-            <a:schemeClr val="accent6"/>
-          </a:lnRef>
-          <a:fillRef idx="1">
-            <a:schemeClr val="lt1"/>
-          </a:fillRef>
-          <a:effectRef idx="0">
-            <a:schemeClr val="accent6"/>
-          </a:effectRef>
-          <a:fontRef idx="minor">
-            <a:schemeClr val="dk1"/>
-          </a:fontRef>
-        </p:style>
-        <p:txBody>
-          <a:bodyPr wrap="none" rtlCol="0" anchor="ctr"/>
-          <a:lstStyle/>
-          <a:p>
-            <a:pPr algn="ctr"/>
-            <a:r>
-              <a:rPr kumimoji="1" lang="ja-JP" altLang="en-US" sz="900" dirty="0" smtClean="0"/>
-              <a:t>緑</a:t>
-            </a:r>
-            <a:endParaRPr kumimoji="1" lang="en-US" altLang="ja-JP" sz="900" dirty="0" smtClean="0"/>
-          </a:p>
-          <a:p>
-            <a:pPr algn="ctr"/>
-            <a:r>
-              <a:rPr lang="ja-JP" altLang="en-US" sz="900" dirty="0"/>
-              <a:t>文字</a:t>
-            </a:r>
-            <a:endParaRPr kumimoji="1" lang="ja-JP" altLang="en-US" sz="900" dirty="0"/>
-          </a:p>
-        </p:txBody>
-      </p:sp>
-      <p:sp>
-        <p:nvSpPr>
-          <p:cNvPr id="84" name="角丸四角形 83"/>
-          <p:cNvSpPr/>
-          <p:nvPr/>
-        </p:nvSpPr>
-        <p:spPr>
-          <a:xfrm>
-            <a:off x="3146533" y="3930376"/>
-            <a:ext cx="466343" cy="467140"/>
-          </a:xfrm>
-          <a:prstGeom prst="roundRect">
-            <a:avLst/>
-          </a:prstGeom>
-        </p:spPr>
-        <p:style>
-          <a:lnRef idx="2">
-            <a:schemeClr val="accent6"/>
-          </a:lnRef>
-          <a:fillRef idx="1">
-            <a:schemeClr val="lt1"/>
-          </a:fillRef>
-          <a:effectRef idx="0">
-            <a:schemeClr val="accent6"/>
-          </a:effectRef>
-          <a:fontRef idx="minor">
-            <a:schemeClr val="dk1"/>
-          </a:fontRef>
-        </p:style>
-        <p:txBody>
-          <a:bodyPr wrap="none" rtlCol="0" anchor="ctr"/>
-          <a:lstStyle/>
-          <a:p>
-            <a:pPr algn="ctr"/>
-            <a:r>
-              <a:rPr kumimoji="1" lang="ja-JP" altLang="en-US" sz="900" dirty="0" smtClean="0"/>
-              <a:t>赤</a:t>
-            </a:r>
-            <a:endParaRPr kumimoji="1" lang="en-US" altLang="ja-JP" sz="900" dirty="0" smtClean="0"/>
-          </a:p>
-          <a:p>
-            <a:pPr algn="ctr"/>
-            <a:r>
-              <a:rPr lang="ja-JP" altLang="en-US" sz="900" dirty="0"/>
-              <a:t>文字</a:t>
-            </a:r>
-            <a:endParaRPr kumimoji="1" lang="ja-JP" altLang="en-US" sz="900" dirty="0"/>
-          </a:p>
-        </p:txBody>
-      </p:sp>
-      <p:sp>
-        <p:nvSpPr>
-          <p:cNvPr id="85" name="角丸四角形 84"/>
-          <p:cNvSpPr/>
-          <p:nvPr/>
-        </p:nvSpPr>
-        <p:spPr>
-          <a:xfrm>
-            <a:off x="3680669" y="3930376"/>
-            <a:ext cx="466343" cy="467140"/>
-          </a:xfrm>
-          <a:prstGeom prst="roundRect">
-            <a:avLst/>
-          </a:prstGeom>
-        </p:spPr>
-        <p:style>
-          <a:lnRef idx="2">
-            <a:schemeClr val="accent6"/>
-          </a:lnRef>
-          <a:fillRef idx="1">
-            <a:schemeClr val="lt1"/>
-          </a:fillRef>
-          <a:effectRef idx="0">
-            <a:schemeClr val="accent6"/>
-          </a:effectRef>
-          <a:fontRef idx="minor">
-            <a:schemeClr val="dk1"/>
-          </a:fontRef>
-        </p:style>
-        <p:txBody>
-          <a:bodyPr wrap="none" rtlCol="0" anchor="ctr"/>
-          <a:lstStyle/>
-          <a:p>
-            <a:pPr algn="ctr"/>
-            <a:r>
-              <a:rPr kumimoji="1" lang="ja-JP" altLang="en-US" sz="900" dirty="0" smtClean="0"/>
-              <a:t>文字</a:t>
-            </a:r>
-            <a:endParaRPr kumimoji="1" lang="en-US" altLang="ja-JP" sz="900" dirty="0" smtClean="0"/>
-          </a:p>
-          <a:p>
-            <a:pPr algn="ctr"/>
-            <a:r>
-              <a:rPr lang="ja-JP" altLang="en-US" sz="900" dirty="0"/>
-              <a:t>色変更</a:t>
-            </a:r>
-            <a:endParaRPr kumimoji="1" lang="ja-JP" altLang="en-US" sz="900" dirty="0"/>
-          </a:p>
-        </p:txBody>
-      </p:sp>
-      <p:sp>
-        <p:nvSpPr>
-          <p:cNvPr id="86" name="角丸四角形 85"/>
-          <p:cNvSpPr/>
-          <p:nvPr/>
-        </p:nvSpPr>
-        <p:spPr>
-          <a:xfrm>
-            <a:off x="4214805" y="3930376"/>
-            <a:ext cx="466343" cy="467140"/>
-          </a:xfrm>
-          <a:prstGeom prst="roundRect">
-            <a:avLst/>
-          </a:prstGeom>
-        </p:spPr>
-        <p:style>
-          <a:lnRef idx="2">
-            <a:schemeClr val="accent6"/>
-          </a:lnRef>
-          <a:fillRef idx="1">
-            <a:schemeClr val="lt1"/>
-          </a:fillRef>
-          <a:effectRef idx="0">
-            <a:schemeClr val="accent6"/>
-          </a:effectRef>
-          <a:fontRef idx="minor">
-            <a:schemeClr val="dk1"/>
-          </a:fontRef>
-        </p:style>
-        <p:txBody>
-          <a:bodyPr wrap="none" rtlCol="0" anchor="ctr"/>
-          <a:lstStyle/>
-          <a:p>
-            <a:pPr algn="ctr"/>
-            <a:endParaRPr kumimoji="1" lang="ja-JP" altLang="en-US" sz="900" dirty="0"/>
-          </a:p>
-        </p:txBody>
-      </p:sp>
-      <p:sp>
-        <p:nvSpPr>
-          <p:cNvPr id="87" name="角丸四角形 86"/>
-          <p:cNvSpPr/>
-          <p:nvPr/>
-        </p:nvSpPr>
-        <p:spPr>
-          <a:xfrm>
-            <a:off x="4748941" y="3930376"/>
-            <a:ext cx="466343" cy="467140"/>
-          </a:xfrm>
-          <a:prstGeom prst="roundRect">
-            <a:avLst/>
-          </a:prstGeom>
-        </p:spPr>
-        <p:style>
-          <a:lnRef idx="2">
-            <a:schemeClr val="accent6"/>
-          </a:lnRef>
-          <a:fillRef idx="1">
-            <a:schemeClr val="lt1"/>
-          </a:fillRef>
-          <a:effectRef idx="0">
-            <a:schemeClr val="accent6"/>
-          </a:effectRef>
-          <a:fontRef idx="minor">
-            <a:schemeClr val="dk1"/>
-          </a:fontRef>
-        </p:style>
-        <p:txBody>
-          <a:bodyPr wrap="none" rtlCol="0" anchor="ctr"/>
-          <a:lstStyle/>
-          <a:p>
-            <a:pPr algn="ctr"/>
-            <a:endParaRPr kumimoji="1" lang="ja-JP" altLang="en-US" sz="900" dirty="0"/>
-          </a:p>
-        </p:txBody>
-      </p:sp>
-      <p:sp>
-        <p:nvSpPr>
-          <p:cNvPr id="88" name="角丸四角形 87"/>
-          <p:cNvSpPr/>
-          <p:nvPr/>
-        </p:nvSpPr>
-        <p:spPr>
-          <a:xfrm>
-            <a:off x="5283077" y="3930376"/>
-            <a:ext cx="466343" cy="467140"/>
-          </a:xfrm>
-          <a:prstGeom prst="roundRect">
-            <a:avLst/>
-          </a:prstGeom>
-        </p:spPr>
-        <p:style>
-          <a:lnRef idx="2">
-            <a:schemeClr val="accent6"/>
-          </a:lnRef>
-          <a:fillRef idx="1">
-            <a:schemeClr val="lt1"/>
-          </a:fillRef>
-          <a:effectRef idx="0">
-            <a:schemeClr val="accent6"/>
-          </a:effectRef>
-          <a:fontRef idx="minor">
-            <a:schemeClr val="dk1"/>
-          </a:fontRef>
-        </p:style>
-        <p:txBody>
-          <a:bodyPr wrap="none" rtlCol="0" anchor="ctr"/>
-          <a:lstStyle/>
-          <a:p>
-            <a:pPr algn="ctr"/>
-            <a:endParaRPr kumimoji="1" lang="en-US" altLang="ja-JP" sz="900" dirty="0" smtClean="0"/>
-          </a:p>
-        </p:txBody>
-      </p:sp>
-      <p:sp>
-        <p:nvSpPr>
-          <p:cNvPr id="121" name="角丸四角形 120"/>
-          <p:cNvSpPr/>
-          <p:nvPr/>
-        </p:nvSpPr>
-        <p:spPr>
-          <a:xfrm>
-            <a:off x="5817213" y="3930376"/>
-            <a:ext cx="466343" cy="467140"/>
-          </a:xfrm>
-          <a:prstGeom prst="roundRect">
-            <a:avLst/>
-          </a:prstGeom>
-        </p:spPr>
-        <p:style>
-          <a:lnRef idx="2">
-            <a:schemeClr val="accent6"/>
-          </a:lnRef>
-          <a:fillRef idx="1">
-            <a:schemeClr val="lt1"/>
-          </a:fillRef>
-          <a:effectRef idx="0">
-            <a:schemeClr val="accent6"/>
-          </a:effectRef>
-          <a:fontRef idx="minor">
-            <a:schemeClr val="dk1"/>
-          </a:fontRef>
-        </p:style>
-        <p:txBody>
-          <a:bodyPr wrap="none" rtlCol="0" anchor="ctr"/>
-          <a:lstStyle/>
-          <a:p>
-            <a:pPr algn="ctr"/>
-            <a:endParaRPr kumimoji="1" lang="ja-JP" altLang="en-US" sz="900" dirty="0"/>
-          </a:p>
-        </p:txBody>
-      </p:sp>
-      <p:sp>
-        <p:nvSpPr>
-          <p:cNvPr id="122" name="角丸四角形 121"/>
-          <p:cNvSpPr/>
-          <p:nvPr/>
-        </p:nvSpPr>
-        <p:spPr>
-          <a:xfrm>
-            <a:off x="6351349" y="3930376"/>
-            <a:ext cx="466343" cy="467140"/>
-          </a:xfrm>
-          <a:prstGeom prst="roundRect">
-            <a:avLst/>
-          </a:prstGeom>
-        </p:spPr>
-        <p:style>
-          <a:lnRef idx="2">
-            <a:schemeClr val="accent6"/>
-          </a:lnRef>
-          <a:fillRef idx="1">
-            <a:schemeClr val="lt1"/>
-          </a:fillRef>
-          <a:effectRef idx="0">
-            <a:schemeClr val="accent6"/>
-          </a:effectRef>
-          <a:fontRef idx="minor">
-            <a:schemeClr val="dk1"/>
-          </a:fontRef>
-        </p:style>
-        <p:txBody>
-          <a:bodyPr wrap="none" rtlCol="0" anchor="ctr"/>
-          <a:lstStyle/>
-          <a:p>
-            <a:pPr algn="ctr"/>
-            <a:endParaRPr kumimoji="1" lang="ja-JP" altLang="en-US" sz="900" dirty="0"/>
-          </a:p>
-        </p:txBody>
-      </p:sp>
-      <p:sp>
-        <p:nvSpPr>
-          <p:cNvPr id="123" name="角丸四角形 122"/>
-          <p:cNvSpPr/>
-          <p:nvPr/>
-        </p:nvSpPr>
-        <p:spPr>
-          <a:xfrm>
-            <a:off x="6885485" y="3930376"/>
-            <a:ext cx="466343" cy="467140"/>
-          </a:xfrm>
-          <a:prstGeom prst="roundRect">
-            <a:avLst/>
-          </a:prstGeom>
-        </p:spPr>
-        <p:style>
-          <a:lnRef idx="2">
-            <a:schemeClr val="accent6"/>
-          </a:lnRef>
-          <a:fillRef idx="1">
-            <a:schemeClr val="lt1"/>
-          </a:fillRef>
-          <a:effectRef idx="0">
-            <a:schemeClr val="accent6"/>
-          </a:effectRef>
-          <a:fontRef idx="minor">
-            <a:schemeClr val="dk1"/>
-          </a:fontRef>
-        </p:style>
-        <p:txBody>
-          <a:bodyPr wrap="none" rtlCol="0" anchor="ctr"/>
-          <a:lstStyle/>
-          <a:p>
-            <a:pPr algn="ctr"/>
-            <a:endParaRPr kumimoji="1" lang="ja-JP" altLang="en-US" sz="900" dirty="0"/>
-          </a:p>
-        </p:txBody>
-      </p:sp>
-      <p:sp>
-        <p:nvSpPr>
-          <p:cNvPr id="124" name="角丸四角形 123"/>
-          <p:cNvSpPr/>
-          <p:nvPr/>
-        </p:nvSpPr>
-        <p:spPr>
-          <a:xfrm>
-            <a:off x="7419621" y="3930376"/>
-            <a:ext cx="466343" cy="467140"/>
-          </a:xfrm>
-          <a:prstGeom prst="roundRect">
-            <a:avLst/>
-          </a:prstGeom>
-        </p:spPr>
-        <p:style>
-          <a:lnRef idx="2">
-            <a:schemeClr val="accent6"/>
-          </a:lnRef>
-          <a:fillRef idx="1">
-            <a:schemeClr val="lt1"/>
-          </a:fillRef>
-          <a:effectRef idx="0">
-            <a:schemeClr val="accent6"/>
-          </a:effectRef>
-          <a:fontRef idx="minor">
-            <a:schemeClr val="dk1"/>
-          </a:fontRef>
-        </p:style>
-        <p:txBody>
-          <a:bodyPr wrap="none" rtlCol="0" anchor="ctr"/>
-          <a:lstStyle/>
-          <a:p>
-            <a:pPr algn="ctr"/>
-            <a:endParaRPr kumimoji="1" lang="ja-JP" altLang="en-US" sz="900" dirty="0"/>
-          </a:p>
-        </p:txBody>
-      </p:sp>
-      <p:sp>
-        <p:nvSpPr>
-          <p:cNvPr id="125" name="角丸四角形 124"/>
-          <p:cNvSpPr/>
-          <p:nvPr/>
-        </p:nvSpPr>
-        <p:spPr>
-          <a:xfrm>
-            <a:off x="1544125" y="3930376"/>
-            <a:ext cx="466343" cy="467140"/>
-          </a:xfrm>
-          <a:prstGeom prst="roundRect">
-            <a:avLst/>
-          </a:prstGeom>
-        </p:spPr>
-        <p:style>
-          <a:lnRef idx="2">
-            <a:schemeClr val="accent6"/>
-          </a:lnRef>
-          <a:fillRef idx="1">
-            <a:schemeClr val="lt1"/>
-          </a:fillRef>
-          <a:effectRef idx="0">
-            <a:schemeClr val="accent6"/>
-          </a:effectRef>
-          <a:fontRef idx="minor">
-            <a:schemeClr val="dk1"/>
-          </a:fontRef>
-        </p:style>
-        <p:txBody>
-          <a:bodyPr wrap="none" rtlCol="0" anchor="ctr"/>
-          <a:lstStyle/>
-          <a:p>
-            <a:pPr algn="ctr"/>
-            <a:r>
-              <a:rPr kumimoji="1" lang="ja-JP" altLang="en-US" sz="900" dirty="0" smtClean="0"/>
-              <a:t>橙</a:t>
-            </a:r>
-            <a:endParaRPr kumimoji="1" lang="en-US" altLang="ja-JP" sz="900" dirty="0" smtClean="0"/>
-          </a:p>
-          <a:p>
-            <a:pPr algn="ctr"/>
-            <a:r>
-              <a:rPr lang="ja-JP" altLang="en-US" sz="900" dirty="0"/>
-              <a:t>文字</a:t>
-            </a:r>
-            <a:endParaRPr kumimoji="1" lang="ja-JP" altLang="en-US" sz="900" dirty="0"/>
+            <a:endParaRPr kumimoji="1" lang="ja-JP" altLang="en-US" sz="900" dirty="0">
+              <a:solidFill>
+                <a:schemeClr val="accent5">
+                  <a:lumMod val="75000"/>
+                </a:schemeClr>
+              </a:solidFill>
+            </a:endParaRPr>
           </a:p>
         </p:txBody>
       </p:sp>
@@ -23751,6 +24004,47 @@
           </a:p>
         </p:txBody>
       </p:sp>
+      <p:pic>
+        <p:nvPicPr>
+          <p:cNvPr id="1026" name="Picture 2" descr="https://upload.wikimedia.org/wikipedia/commons/thumb/b/b0/Microsoft_PowerPoint_2013_logo.svg/2000px-Microsoft_PowerPoint_2013_logo.svg.png"/>
+          <p:cNvPicPr>
+            <a:picLocks noChangeAspect="1" noChangeArrowheads="1"/>
+          </p:cNvPicPr>
+          <p:nvPr/>
+        </p:nvPicPr>
+        <p:blipFill>
+          <a:blip r:embed="rId2" cstate="print">
+            <a:extLst>
+              <a:ext uri="{28A0092B-C50C-407E-A947-70E740481C1C}">
+                <a14:useLocalDpi xmlns:a14="http://schemas.microsoft.com/office/drawing/2010/main" val="0"/>
+              </a:ext>
+            </a:extLst>
+          </a:blip>
+          <a:srcRect/>
+          <a:stretch>
+            <a:fillRect/>
+          </a:stretch>
+        </p:blipFill>
+        <p:spPr bwMode="auto">
+          <a:xfrm>
+            <a:off x="5198771" y="2231090"/>
+            <a:ext cx="792834" cy="779012"/>
+          </a:xfrm>
+          <a:prstGeom prst="rect">
+            <a:avLst/>
+          </a:prstGeom>
+          <a:noFill/>
+          <a:extLst>
+            <a:ext uri="{909E8E84-426E-40DD-AFC4-6F175D3DCCD1}">
+              <a14:hiddenFill xmlns:a14="http://schemas.microsoft.com/office/drawing/2010/main">
+                <a:solidFill>
+                  <a:srgbClr val="FFFFFF"/>
+                </a:solidFill>
+              </a14:hiddenFill>
+            </a:ext>
+          </a:extLst>
+        </p:spPr>
+      </p:pic>
     </p:spTree>
     <p:extLst>
       <p:ext uri="{BB962C8B-B14F-4D97-AF65-F5344CB8AC3E}">

</xml_diff>